<commit_message>
Inserindo o projeto Analisando dados de um dashboard de vendas no Power BI
</commit_message>
<xml_diff>
--- a/Criando um relatório de vendas elegante/Paineis/Painel interativo.pptx
+++ b/Criando um relatório de vendas elegante/Paineis/Painel interativo.pptx
@@ -5,14 +5,12 @@
     <p:sldMasterId id="2147483648" r:id="rId1"/>
   </p:sldMasterIdLst>
   <p:notesMasterIdLst>
-    <p:notesMasterId r:id="rId7"/>
+    <p:notesMasterId r:id="rId5"/>
   </p:notesMasterIdLst>
   <p:sldIdLst>
     <p:sldId id="263" r:id="rId2"/>
     <p:sldId id="278" r:id="rId3"/>
     <p:sldId id="279" r:id="rId4"/>
-    <p:sldId id="276" r:id="rId5"/>
-    <p:sldId id="277" r:id="rId6"/>
   </p:sldIdLst>
   <p:sldSz cx="12192000" cy="6858000"/>
   <p:notesSz cx="6858000" cy="9144000"/>
@@ -201,7 +199,7 @@
           <a:p>
             <a:fld id="{1B9B11F9-E227-4D57-813B-A58171BBE71E}" type="datetimeFigureOut">
               <a:rPr lang="pt-BR" smtClean="0"/>
-              <a:t>02/05/2024</a:t>
+              <a:t>14/09/2024</a:t>
             </a:fld>
             <a:endParaRPr lang="pt-BR"/>
           </a:p>
@@ -597,7 +595,7 @@
           <a:p>
             <a:fld id="{0E69D9FF-5D3A-47B1-967B-F72A1984A174}" type="datetimeFigureOut">
               <a:rPr lang="pt-BR" smtClean="0"/>
-              <a:t>02/05/2024</a:t>
+              <a:t>14/09/2024</a:t>
             </a:fld>
             <a:endParaRPr lang="pt-BR"/>
           </a:p>
@@ -765,7 +763,7 @@
           <a:p>
             <a:fld id="{0E69D9FF-5D3A-47B1-967B-F72A1984A174}" type="datetimeFigureOut">
               <a:rPr lang="pt-BR" smtClean="0"/>
-              <a:t>02/05/2024</a:t>
+              <a:t>14/09/2024</a:t>
             </a:fld>
             <a:endParaRPr lang="pt-BR"/>
           </a:p>
@@ -943,7 +941,7 @@
           <a:p>
             <a:fld id="{0E69D9FF-5D3A-47B1-967B-F72A1984A174}" type="datetimeFigureOut">
               <a:rPr lang="pt-BR" smtClean="0"/>
-              <a:t>02/05/2024</a:t>
+              <a:t>14/09/2024</a:t>
             </a:fld>
             <a:endParaRPr lang="pt-BR"/>
           </a:p>
@@ -1111,7 +1109,7 @@
           <a:p>
             <a:fld id="{0E69D9FF-5D3A-47B1-967B-F72A1984A174}" type="datetimeFigureOut">
               <a:rPr lang="pt-BR" smtClean="0"/>
-              <a:t>02/05/2024</a:t>
+              <a:t>14/09/2024</a:t>
             </a:fld>
             <a:endParaRPr lang="pt-BR"/>
           </a:p>
@@ -1356,7 +1354,7 @@
           <a:p>
             <a:fld id="{0E69D9FF-5D3A-47B1-967B-F72A1984A174}" type="datetimeFigureOut">
               <a:rPr lang="pt-BR" smtClean="0"/>
-              <a:t>02/05/2024</a:t>
+              <a:t>14/09/2024</a:t>
             </a:fld>
             <a:endParaRPr lang="pt-BR"/>
           </a:p>
@@ -1585,7 +1583,7 @@
           <a:p>
             <a:fld id="{0E69D9FF-5D3A-47B1-967B-F72A1984A174}" type="datetimeFigureOut">
               <a:rPr lang="pt-BR" smtClean="0"/>
-              <a:t>02/05/2024</a:t>
+              <a:t>14/09/2024</a:t>
             </a:fld>
             <a:endParaRPr lang="pt-BR"/>
           </a:p>
@@ -1949,7 +1947,7 @@
           <a:p>
             <a:fld id="{0E69D9FF-5D3A-47B1-967B-F72A1984A174}" type="datetimeFigureOut">
               <a:rPr lang="pt-BR" smtClean="0"/>
-              <a:t>02/05/2024</a:t>
+              <a:t>14/09/2024</a:t>
             </a:fld>
             <a:endParaRPr lang="pt-BR"/>
           </a:p>
@@ -2066,7 +2064,7 @@
           <a:p>
             <a:fld id="{0E69D9FF-5D3A-47B1-967B-F72A1984A174}" type="datetimeFigureOut">
               <a:rPr lang="pt-BR" smtClean="0"/>
-              <a:t>02/05/2024</a:t>
+              <a:t>14/09/2024</a:t>
             </a:fld>
             <a:endParaRPr lang="pt-BR"/>
           </a:p>
@@ -2161,7 +2159,7 @@
           <a:p>
             <a:fld id="{0E69D9FF-5D3A-47B1-967B-F72A1984A174}" type="datetimeFigureOut">
               <a:rPr lang="pt-BR" smtClean="0"/>
-              <a:t>02/05/2024</a:t>
+              <a:t>14/09/2024</a:t>
             </a:fld>
             <a:endParaRPr lang="pt-BR"/>
           </a:p>
@@ -2436,7 +2434,7 @@
           <a:p>
             <a:fld id="{0E69D9FF-5D3A-47B1-967B-F72A1984A174}" type="datetimeFigureOut">
               <a:rPr lang="pt-BR" smtClean="0"/>
-              <a:t>02/05/2024</a:t>
+              <a:t>14/09/2024</a:t>
             </a:fld>
             <a:endParaRPr lang="pt-BR"/>
           </a:p>
@@ -2688,7 +2686,7 @@
           <a:p>
             <a:fld id="{0E69D9FF-5D3A-47B1-967B-F72A1984A174}" type="datetimeFigureOut">
               <a:rPr lang="pt-BR" smtClean="0"/>
-              <a:t>02/05/2024</a:t>
+              <a:t>14/09/2024</a:t>
             </a:fld>
             <a:endParaRPr lang="pt-BR"/>
           </a:p>
@@ -2899,7 +2897,7 @@
           <a:p>
             <a:fld id="{0E69D9FF-5D3A-47B1-967B-F72A1984A174}" type="datetimeFigureOut">
               <a:rPr lang="pt-BR" smtClean="0"/>
-              <a:t>02/05/2024</a:t>
+              <a:t>14/09/2024</a:t>
             </a:fld>
             <a:endParaRPr lang="pt-BR"/>
           </a:p>
@@ -6131,1550 +6129,6 @@
     <p:extLst>
       <p:ext uri="{BB962C8B-B14F-4D97-AF65-F5344CB8AC3E}">
         <p14:creationId xmlns:p14="http://schemas.microsoft.com/office/powerpoint/2010/main" val="1425350042"/>
-      </p:ext>
-    </p:extLst>
-  </p:cSld>
-  <p:clrMapOvr>
-    <a:masterClrMapping/>
-  </p:clrMapOvr>
-</p:sld>
-</file>
-
-<file path=ppt/slides/slide4.xml><?xml version="1.0" encoding="utf-8"?>
-<p:sld xmlns:a="http://schemas.openxmlformats.org/drawingml/2006/main" xmlns:r="http://schemas.openxmlformats.org/officeDocument/2006/relationships" xmlns:p="http://schemas.openxmlformats.org/presentationml/2006/main">
-  <p:cSld>
-    <p:bg>
-      <p:bgPr>
-        <a:solidFill>
-          <a:srgbClr val="F2F2F2"/>
-        </a:solidFill>
-        <a:effectLst/>
-      </p:bgPr>
-    </p:bg>
-    <p:spTree>
-      <p:nvGrpSpPr>
-        <p:cNvPr id="1" name=""/>
-        <p:cNvGrpSpPr/>
-        <p:nvPr/>
-      </p:nvGrpSpPr>
-      <p:grpSpPr>
-        <a:xfrm>
-          <a:off x="0" y="0"/>
-          <a:ext cx="0" cy="0"/>
-          <a:chOff x="0" y="0"/>
-          <a:chExt cx="0" cy="0"/>
-        </a:xfrm>
-      </p:grpSpPr>
-      <p:sp>
-        <p:nvSpPr>
-          <p:cNvPr id="2" name="Retângulo 1"/>
-          <p:cNvSpPr/>
-          <p:nvPr/>
-        </p:nvSpPr>
-        <p:spPr>
-          <a:xfrm>
-            <a:off x="0" y="1705"/>
-            <a:ext cx="12192000" cy="6858000"/>
-          </a:xfrm>
-          <a:prstGeom prst="rect">
-            <a:avLst/>
-          </a:prstGeom>
-          <a:solidFill>
-            <a:srgbClr val="F2F2F2"/>
-          </a:solidFill>
-          <a:ln>
-            <a:noFill/>
-          </a:ln>
-        </p:spPr>
-        <p:style>
-          <a:lnRef idx="2">
-            <a:schemeClr val="accent1">
-              <a:shade val="50000"/>
-            </a:schemeClr>
-          </a:lnRef>
-          <a:fillRef idx="1">
-            <a:schemeClr val="accent1"/>
-          </a:fillRef>
-          <a:effectRef idx="0">
-            <a:schemeClr val="accent1"/>
-          </a:effectRef>
-          <a:fontRef idx="minor">
-            <a:schemeClr val="lt1"/>
-          </a:fontRef>
-        </p:style>
-        <p:txBody>
-          <a:bodyPr rtlCol="0" anchor="ctr"/>
-          <a:lstStyle/>
-          <a:p>
-            <a:pPr algn="ctr"/>
-            <a:endParaRPr lang="pt-BR"/>
-          </a:p>
-        </p:txBody>
-      </p:sp>
-      <p:sp>
-        <p:nvSpPr>
-          <p:cNvPr id="20" name="Retângulo de cantos arredondados 19"/>
-          <p:cNvSpPr/>
-          <p:nvPr/>
-        </p:nvSpPr>
-        <p:spPr>
-          <a:xfrm>
-            <a:off x="4081624" y="1688721"/>
-            <a:ext cx="1694079" cy="1517901"/>
-          </a:xfrm>
-          <a:prstGeom prst="roundRect">
-            <a:avLst/>
-          </a:prstGeom>
-          <a:solidFill>
-            <a:srgbClr val="F2F2F2"/>
-          </a:solidFill>
-          <a:effectLst>
-            <a:outerShdw blurRad="50800" dist="50800" dir="5400000" algn="ctr" rotWithShape="0">
-              <a:srgbClr val="F2F2F2"/>
-            </a:outerShdw>
-          </a:effectLst>
-        </p:spPr>
-        <p:style>
-          <a:lnRef idx="2">
-            <a:schemeClr val="accent1">
-              <a:shade val="50000"/>
-            </a:schemeClr>
-          </a:lnRef>
-          <a:fillRef idx="1">
-            <a:schemeClr val="accent1"/>
-          </a:fillRef>
-          <a:effectRef idx="0">
-            <a:schemeClr val="accent1"/>
-          </a:effectRef>
-          <a:fontRef idx="minor">
-            <a:schemeClr val="lt1"/>
-          </a:fontRef>
-        </p:style>
-        <p:txBody>
-          <a:bodyPr rtlCol="0" anchor="ctr"/>
-          <a:lstStyle/>
-          <a:p>
-            <a:pPr algn="ctr"/>
-            <a:endParaRPr lang="pt-BR"/>
-          </a:p>
-        </p:txBody>
-      </p:sp>
-      <p:sp>
-        <p:nvSpPr>
-          <p:cNvPr id="13" name="Retângulo de cantos arredondados 12"/>
-          <p:cNvSpPr/>
-          <p:nvPr/>
-        </p:nvSpPr>
-        <p:spPr>
-          <a:xfrm>
-            <a:off x="6175931" y="1679129"/>
-            <a:ext cx="1694079" cy="1527493"/>
-          </a:xfrm>
-          <a:prstGeom prst="roundRect">
-            <a:avLst/>
-          </a:prstGeom>
-          <a:solidFill>
-            <a:srgbClr val="F2F2F2"/>
-          </a:solidFill>
-        </p:spPr>
-        <p:style>
-          <a:lnRef idx="2">
-            <a:schemeClr val="accent1">
-              <a:shade val="50000"/>
-            </a:schemeClr>
-          </a:lnRef>
-          <a:fillRef idx="1">
-            <a:schemeClr val="accent1"/>
-          </a:fillRef>
-          <a:effectRef idx="0">
-            <a:schemeClr val="accent1"/>
-          </a:effectRef>
-          <a:fontRef idx="minor">
-            <a:schemeClr val="lt1"/>
-          </a:fontRef>
-        </p:style>
-        <p:txBody>
-          <a:bodyPr rtlCol="0" anchor="ctr"/>
-          <a:lstStyle/>
-          <a:p>
-            <a:pPr algn="ctr"/>
-            <a:endParaRPr lang="pt-BR"/>
-          </a:p>
-        </p:txBody>
-      </p:sp>
-      <p:sp>
-        <p:nvSpPr>
-          <p:cNvPr id="4" name="Título 1"/>
-          <p:cNvSpPr txBox="1">
-            <a:spLocks/>
-          </p:cNvSpPr>
-          <p:nvPr/>
-        </p:nvSpPr>
-        <p:spPr>
-          <a:xfrm>
-            <a:off x="127000" y="433838"/>
-            <a:ext cx="4579414" cy="840779"/>
-          </a:xfrm>
-          <a:prstGeom prst="rect">
-            <a:avLst/>
-          </a:prstGeom>
-        </p:spPr>
-        <p:txBody>
-          <a:bodyPr vert="horz" lIns="91440" tIns="45720" rIns="91440" bIns="45720" rtlCol="0" anchor="ctr">
-            <a:normAutofit/>
-          </a:bodyPr>
-          <a:lstStyle>
-            <a:lvl1pPr algn="l" defTabSz="914400" rtl="0" eaLnBrk="1" latinLnBrk="0" hangingPunct="1">
-              <a:lnSpc>
-                <a:spcPct val="90000"/>
-              </a:lnSpc>
-              <a:spcBef>
-                <a:spcPct val="0"/>
-              </a:spcBef>
-              <a:buNone/>
-              <a:defRPr sz="4400" kern="1200">
-                <a:solidFill>
-                  <a:schemeClr val="tx1"/>
-                </a:solidFill>
-                <a:latin typeface="+mj-lt"/>
-                <a:ea typeface="+mj-ea"/>
-                <a:cs typeface="+mj-cs"/>
-              </a:defRPr>
-            </a:lvl1pPr>
-          </a:lstStyle>
-          <a:p>
-            <a:r>
-              <a:rPr lang="pt-BR" sz="3600" b="1" dirty="0">
-                <a:ln w="9525">
-                  <a:solidFill>
-                    <a:schemeClr val="bg1"/>
-                  </a:solidFill>
-                  <a:prstDash val="solid"/>
-                </a:ln>
-                <a:solidFill>
-                  <a:schemeClr val="accent5"/>
-                </a:solidFill>
-                <a:effectLst>
-                  <a:outerShdw blurRad="12700" dist="38100" dir="2700000" algn="tl" rotWithShape="0">
-                    <a:schemeClr val="accent5">
-                      <a:lumMod val="60000"/>
-                      <a:lumOff val="40000"/>
-                    </a:schemeClr>
-                  </a:outerShdw>
-                </a:effectLst>
-                <a:latin typeface="Arial" panose="020B0604020202020204" pitchFamily="34" charset="0"/>
-                <a:cs typeface="Arial" panose="020B0604020202020204" pitchFamily="34" charset="0"/>
-              </a:rPr>
-              <a:t>Painel de Análise</a:t>
-            </a:r>
-          </a:p>
-        </p:txBody>
-      </p:sp>
-      <p:sp>
-        <p:nvSpPr>
-          <p:cNvPr id="14" name="CaixaDeTexto 13"/>
-          <p:cNvSpPr txBox="1"/>
-          <p:nvPr/>
-        </p:nvSpPr>
-        <p:spPr>
-          <a:xfrm>
-            <a:off x="4242899" y="2800813"/>
-            <a:ext cx="1420541" cy="369332"/>
-          </a:xfrm>
-          <a:prstGeom prst="rect">
-            <a:avLst/>
-          </a:prstGeom>
-          <a:noFill/>
-        </p:spPr>
-        <p:txBody>
-          <a:bodyPr wrap="square" rtlCol="0">
-            <a:spAutoFit/>
-          </a:bodyPr>
-          <a:lstStyle/>
-          <a:p>
-            <a:pPr algn="ctr"/>
-            <a:r>
-              <a:rPr lang="pt-BR" dirty="0">
-                <a:ln w="0"/>
-                <a:effectLst>
-                  <a:outerShdw blurRad="38100" dist="19050" dir="2700000" algn="tl" rotWithShape="0">
-                    <a:schemeClr val="dk1">
-                      <a:alpha val="40000"/>
-                    </a:schemeClr>
-                  </a:outerShdw>
-                </a:effectLst>
-              </a:rPr>
-              <a:t>BDMF</a:t>
-            </a:r>
-            <a:endParaRPr lang="pt-BR" dirty="0"/>
-          </a:p>
-        </p:txBody>
-      </p:sp>
-      <p:pic>
-        <p:nvPicPr>
-          <p:cNvPr id="6" name="Imagem 5"/>
-          <p:cNvPicPr>
-            <a:picLocks noChangeAspect="1"/>
-          </p:cNvPicPr>
-          <p:nvPr/>
-        </p:nvPicPr>
-        <p:blipFill>
-          <a:blip r:embed="rId2"/>
-          <a:stretch>
-            <a:fillRect/>
-          </a:stretch>
-        </p:blipFill>
-        <p:spPr>
-          <a:xfrm>
-            <a:off x="9637095" y="42990"/>
-            <a:ext cx="2554905" cy="1379409"/>
-          </a:xfrm>
-          <a:prstGeom prst="rect">
-            <a:avLst/>
-          </a:prstGeom>
-        </p:spPr>
-      </p:pic>
-      <p:pic>
-        <p:nvPicPr>
-          <p:cNvPr id="15" name="Imagem 14"/>
-          <p:cNvPicPr>
-            <a:picLocks noChangeAspect="1"/>
-          </p:cNvPicPr>
-          <p:nvPr/>
-        </p:nvPicPr>
-        <p:blipFill>
-          <a:blip r:embed="rId3"/>
-          <a:stretch>
-            <a:fillRect/>
-          </a:stretch>
-        </p:blipFill>
-        <p:spPr>
-          <a:xfrm>
-            <a:off x="4439145" y="1768028"/>
-            <a:ext cx="1078851" cy="1078851"/>
-          </a:xfrm>
-          <a:prstGeom prst="rect">
-            <a:avLst/>
-          </a:prstGeom>
-        </p:spPr>
-      </p:pic>
-      <p:pic>
-        <p:nvPicPr>
-          <p:cNvPr id="16" name="Imagem 15"/>
-          <p:cNvPicPr>
-            <a:picLocks noChangeAspect="1"/>
-          </p:cNvPicPr>
-          <p:nvPr/>
-        </p:nvPicPr>
-        <p:blipFill>
-          <a:blip r:embed="rId4"/>
-          <a:stretch>
-            <a:fillRect/>
-          </a:stretch>
-        </p:blipFill>
-        <p:spPr>
-          <a:xfrm>
-            <a:off x="6610544" y="1767705"/>
-            <a:ext cx="888676" cy="888676"/>
-          </a:xfrm>
-          <a:prstGeom prst="rect">
-            <a:avLst/>
-          </a:prstGeom>
-        </p:spPr>
-      </p:pic>
-      <p:sp>
-        <p:nvSpPr>
-          <p:cNvPr id="17" name="CaixaDeTexto 16"/>
-          <p:cNvSpPr txBox="1"/>
-          <p:nvPr/>
-        </p:nvSpPr>
-        <p:spPr>
-          <a:xfrm>
-            <a:off x="6184023" y="2560291"/>
-            <a:ext cx="1685987" cy="646331"/>
-          </a:xfrm>
-          <a:prstGeom prst="rect">
-            <a:avLst/>
-          </a:prstGeom>
-          <a:noFill/>
-        </p:spPr>
-        <p:txBody>
-          <a:bodyPr wrap="square" rtlCol="0">
-            <a:spAutoFit/>
-          </a:bodyPr>
-          <a:lstStyle/>
-          <a:p>
-            <a:pPr algn="ctr"/>
-            <a:r>
-              <a:rPr lang="pt-BR" dirty="0">
-                <a:ln w="0"/>
-                <a:effectLst>
-                  <a:outerShdw blurRad="38100" dist="19050" dir="2700000" algn="tl" rotWithShape="0">
-                    <a:schemeClr val="dk1">
-                      <a:alpha val="40000"/>
-                    </a:schemeClr>
-                  </a:outerShdw>
-                </a:effectLst>
-              </a:rPr>
-              <a:t>Dados de leitura</a:t>
-            </a:r>
-            <a:endParaRPr lang="pt-BR" dirty="0"/>
-          </a:p>
-        </p:txBody>
-      </p:sp>
-      <p:sp>
-        <p:nvSpPr>
-          <p:cNvPr id="18" name="Retângulo de cantos arredondados 17"/>
-          <p:cNvSpPr/>
-          <p:nvPr/>
-        </p:nvSpPr>
-        <p:spPr>
-          <a:xfrm>
-            <a:off x="8342045" y="1666744"/>
-            <a:ext cx="1694079" cy="1531973"/>
-          </a:xfrm>
-          <a:prstGeom prst="roundRect">
-            <a:avLst/>
-          </a:prstGeom>
-          <a:solidFill>
-            <a:srgbClr val="F2F2F2"/>
-          </a:solidFill>
-        </p:spPr>
-        <p:style>
-          <a:lnRef idx="2">
-            <a:schemeClr val="accent1">
-              <a:shade val="50000"/>
-            </a:schemeClr>
-          </a:lnRef>
-          <a:fillRef idx="1">
-            <a:schemeClr val="accent1"/>
-          </a:fillRef>
-          <a:effectRef idx="0">
-            <a:schemeClr val="accent1"/>
-          </a:effectRef>
-          <a:fontRef idx="minor">
-            <a:schemeClr val="lt1"/>
-          </a:fontRef>
-        </p:style>
-        <p:txBody>
-          <a:bodyPr rtlCol="0" anchor="ctr"/>
-          <a:lstStyle/>
-          <a:p>
-            <a:pPr algn="ctr"/>
-            <a:endParaRPr lang="pt-BR"/>
-          </a:p>
-        </p:txBody>
-      </p:sp>
-      <p:sp>
-        <p:nvSpPr>
-          <p:cNvPr id="22" name="CaixaDeTexto 21"/>
-          <p:cNvSpPr txBox="1"/>
-          <p:nvPr/>
-        </p:nvSpPr>
-        <p:spPr>
-          <a:xfrm>
-            <a:off x="8422669" y="2567481"/>
-            <a:ext cx="1557311" cy="646331"/>
-          </a:xfrm>
-          <a:prstGeom prst="rect">
-            <a:avLst/>
-          </a:prstGeom>
-          <a:noFill/>
-        </p:spPr>
-        <p:txBody>
-          <a:bodyPr wrap="square" rtlCol="0">
-            <a:spAutoFit/>
-          </a:bodyPr>
-          <a:lstStyle/>
-          <a:p>
-            <a:pPr algn="ctr"/>
-            <a:r>
-              <a:rPr lang="pt-BR" dirty="0">
-                <a:ln w="0"/>
-                <a:effectLst>
-                  <a:outerShdw blurRad="38100" dist="19050" dir="2700000" algn="tl" rotWithShape="0">
-                    <a:schemeClr val="dk1">
-                      <a:alpha val="40000"/>
-                    </a:schemeClr>
-                  </a:outerShdw>
-                </a:effectLst>
-              </a:rPr>
-              <a:t>Parcelamento de débitos</a:t>
-            </a:r>
-            <a:endParaRPr lang="pt-BR" dirty="0"/>
-          </a:p>
-        </p:txBody>
-      </p:sp>
-      <p:sp>
-        <p:nvSpPr>
-          <p:cNvPr id="23" name="Retângulo de cantos arredondados 22"/>
-          <p:cNvSpPr/>
-          <p:nvPr/>
-        </p:nvSpPr>
-        <p:spPr>
-          <a:xfrm>
-            <a:off x="4081624" y="3744609"/>
-            <a:ext cx="1694079" cy="1552363"/>
-          </a:xfrm>
-          <a:prstGeom prst="roundRect">
-            <a:avLst/>
-          </a:prstGeom>
-          <a:solidFill>
-            <a:srgbClr val="F2F2F2"/>
-          </a:solidFill>
-        </p:spPr>
-        <p:style>
-          <a:lnRef idx="2">
-            <a:schemeClr val="accent1">
-              <a:shade val="50000"/>
-            </a:schemeClr>
-          </a:lnRef>
-          <a:fillRef idx="1">
-            <a:schemeClr val="accent1"/>
-          </a:fillRef>
-          <a:effectRef idx="0">
-            <a:schemeClr val="accent1"/>
-          </a:effectRef>
-          <a:fontRef idx="minor">
-            <a:schemeClr val="lt1"/>
-          </a:fontRef>
-        </p:style>
-        <p:txBody>
-          <a:bodyPr rtlCol="0" anchor="ctr"/>
-          <a:lstStyle/>
-          <a:p>
-            <a:pPr algn="ctr"/>
-            <a:endParaRPr lang="pt-BR"/>
-          </a:p>
-        </p:txBody>
-      </p:sp>
-      <p:sp>
-        <p:nvSpPr>
-          <p:cNvPr id="24" name="CaixaDeTexto 23"/>
-          <p:cNvSpPr txBox="1"/>
-          <p:nvPr/>
-        </p:nvSpPr>
-        <p:spPr>
-          <a:xfrm>
-            <a:off x="4106104" y="4616900"/>
-            <a:ext cx="1669599" cy="646331"/>
-          </a:xfrm>
-          <a:prstGeom prst="rect">
-            <a:avLst/>
-          </a:prstGeom>
-          <a:noFill/>
-        </p:spPr>
-        <p:txBody>
-          <a:bodyPr wrap="square" rtlCol="0">
-            <a:spAutoFit/>
-          </a:bodyPr>
-          <a:lstStyle/>
-          <a:p>
-            <a:pPr algn="ctr"/>
-            <a:r>
-              <a:rPr lang="pt-BR" dirty="0">
-                <a:ln w="0"/>
-                <a:effectLst>
-                  <a:outerShdw blurRad="38100" dist="19050" dir="2700000" algn="tl" rotWithShape="0">
-                    <a:schemeClr val="dk1">
-                      <a:alpha val="40000"/>
-                    </a:schemeClr>
-                  </a:outerShdw>
-                </a:effectLst>
-              </a:rPr>
-              <a:t>Listagem de débitos</a:t>
-            </a:r>
-            <a:endParaRPr lang="pt-BR" dirty="0"/>
-          </a:p>
-        </p:txBody>
-      </p:sp>
-      <p:sp>
-        <p:nvSpPr>
-          <p:cNvPr id="26" name="Retângulo de cantos arredondados 25"/>
-          <p:cNvSpPr/>
-          <p:nvPr/>
-        </p:nvSpPr>
-        <p:spPr>
-          <a:xfrm>
-            <a:off x="1857715" y="1688721"/>
-            <a:ext cx="1694079" cy="1552363"/>
-          </a:xfrm>
-          <a:prstGeom prst="roundRect">
-            <a:avLst/>
-          </a:prstGeom>
-          <a:solidFill>
-            <a:srgbClr val="F2F2F2"/>
-          </a:solidFill>
-        </p:spPr>
-        <p:style>
-          <a:lnRef idx="2">
-            <a:schemeClr val="accent1">
-              <a:shade val="50000"/>
-            </a:schemeClr>
-          </a:lnRef>
-          <a:fillRef idx="1">
-            <a:schemeClr val="accent1"/>
-          </a:fillRef>
-          <a:effectRef idx="0">
-            <a:schemeClr val="accent1"/>
-          </a:effectRef>
-          <a:fontRef idx="minor">
-            <a:schemeClr val="lt1"/>
-          </a:fontRef>
-        </p:style>
-        <p:txBody>
-          <a:bodyPr rtlCol="0" anchor="ctr"/>
-          <a:lstStyle/>
-          <a:p>
-            <a:pPr algn="ctr"/>
-            <a:endParaRPr lang="pt-BR"/>
-          </a:p>
-        </p:txBody>
-      </p:sp>
-      <p:pic>
-        <p:nvPicPr>
-          <p:cNvPr id="25" name="Imagem 24"/>
-          <p:cNvPicPr>
-            <a:picLocks noChangeAspect="1"/>
-          </p:cNvPicPr>
-          <p:nvPr/>
-        </p:nvPicPr>
-        <p:blipFill>
-          <a:blip r:embed="rId5"/>
-          <a:stretch>
-            <a:fillRect/>
-          </a:stretch>
-        </p:blipFill>
-        <p:spPr>
-          <a:xfrm>
-            <a:off x="2069943" y="1735627"/>
-            <a:ext cx="1319419" cy="913820"/>
-          </a:xfrm>
-          <a:prstGeom prst="rect">
-            <a:avLst/>
-          </a:prstGeom>
-        </p:spPr>
-      </p:pic>
-      <p:sp>
-        <p:nvSpPr>
-          <p:cNvPr id="27" name="CaixaDeTexto 26"/>
-          <p:cNvSpPr txBox="1"/>
-          <p:nvPr/>
-        </p:nvSpPr>
-        <p:spPr>
-          <a:xfrm>
-            <a:off x="1919820" y="2594753"/>
-            <a:ext cx="1557311" cy="646331"/>
-          </a:xfrm>
-          <a:prstGeom prst="rect">
-            <a:avLst/>
-          </a:prstGeom>
-          <a:noFill/>
-        </p:spPr>
-        <p:txBody>
-          <a:bodyPr wrap="square" rtlCol="0">
-            <a:spAutoFit/>
-          </a:bodyPr>
-          <a:lstStyle/>
-          <a:p>
-            <a:pPr algn="ctr"/>
-            <a:r>
-              <a:rPr lang="pt-BR" dirty="0">
-                <a:ln w="0"/>
-                <a:effectLst>
-                  <a:outerShdw blurRad="38100" dist="19050" dir="2700000" algn="tl" rotWithShape="0">
-                    <a:schemeClr val="dk1">
-                      <a:alpha val="40000"/>
-                    </a:schemeClr>
-                  </a:outerShdw>
-                </a:effectLst>
-              </a:rPr>
-              <a:t>Nossos Números</a:t>
-            </a:r>
-            <a:endParaRPr lang="pt-BR" dirty="0"/>
-          </a:p>
-        </p:txBody>
-      </p:sp>
-      <p:sp>
-        <p:nvSpPr>
-          <p:cNvPr id="29" name="Retângulo de cantos arredondados 28"/>
-          <p:cNvSpPr/>
-          <p:nvPr/>
-        </p:nvSpPr>
-        <p:spPr>
-          <a:xfrm>
-            <a:off x="6231070" y="3744609"/>
-            <a:ext cx="1694079" cy="1552363"/>
-          </a:xfrm>
-          <a:prstGeom prst="roundRect">
-            <a:avLst/>
-          </a:prstGeom>
-          <a:solidFill>
-            <a:srgbClr val="F2F2F2"/>
-          </a:solidFill>
-        </p:spPr>
-        <p:style>
-          <a:lnRef idx="2">
-            <a:schemeClr val="accent1">
-              <a:shade val="50000"/>
-            </a:schemeClr>
-          </a:lnRef>
-          <a:fillRef idx="1">
-            <a:schemeClr val="accent1"/>
-          </a:fillRef>
-          <a:effectRef idx="0">
-            <a:schemeClr val="accent1"/>
-          </a:effectRef>
-          <a:fontRef idx="minor">
-            <a:schemeClr val="lt1"/>
-          </a:fontRef>
-        </p:style>
-        <p:txBody>
-          <a:bodyPr rtlCol="0" anchor="ctr"/>
-          <a:lstStyle/>
-          <a:p>
-            <a:pPr algn="ctr"/>
-            <a:endParaRPr lang="pt-BR"/>
-          </a:p>
-        </p:txBody>
-      </p:sp>
-      <p:sp>
-        <p:nvSpPr>
-          <p:cNvPr id="30" name="CaixaDeTexto 29"/>
-          <p:cNvSpPr txBox="1"/>
-          <p:nvPr/>
-        </p:nvSpPr>
-        <p:spPr>
-          <a:xfrm>
-            <a:off x="6255550" y="4842924"/>
-            <a:ext cx="1669599" cy="369332"/>
-          </a:xfrm>
-          <a:prstGeom prst="rect">
-            <a:avLst/>
-          </a:prstGeom>
-          <a:noFill/>
-        </p:spPr>
-        <p:txBody>
-          <a:bodyPr wrap="square" rtlCol="0">
-            <a:spAutoFit/>
-          </a:bodyPr>
-          <a:lstStyle/>
-          <a:p>
-            <a:pPr algn="ctr"/>
-            <a:r>
-              <a:rPr lang="pt-BR" dirty="0">
-                <a:ln w="0"/>
-                <a:effectLst>
-                  <a:outerShdw blurRad="38100" dist="19050" dir="2700000" algn="tl" rotWithShape="0">
-                    <a:schemeClr val="dk1">
-                      <a:alpha val="40000"/>
-                    </a:schemeClr>
-                  </a:outerShdw>
-                </a:effectLst>
-              </a:rPr>
-              <a:t>Hidrometria</a:t>
-            </a:r>
-            <a:endParaRPr lang="pt-BR" dirty="0"/>
-          </a:p>
-        </p:txBody>
-      </p:sp>
-      <p:pic>
-        <p:nvPicPr>
-          <p:cNvPr id="5" name="Imagem 4"/>
-          <p:cNvPicPr>
-            <a:picLocks noChangeAspect="1"/>
-          </p:cNvPicPr>
-          <p:nvPr/>
-        </p:nvPicPr>
-        <p:blipFill>
-          <a:blip r:embed="rId6"/>
-          <a:stretch>
-            <a:fillRect/>
-          </a:stretch>
-        </p:blipFill>
-        <p:spPr>
-          <a:xfrm>
-            <a:off x="8740318" y="1731198"/>
-            <a:ext cx="1000581" cy="891274"/>
-          </a:xfrm>
-          <a:prstGeom prst="rect">
-            <a:avLst/>
-          </a:prstGeom>
-        </p:spPr>
-      </p:pic>
-      <p:pic>
-        <p:nvPicPr>
-          <p:cNvPr id="8" name="Imagem 7"/>
-          <p:cNvPicPr>
-            <a:picLocks noChangeAspect="1"/>
-          </p:cNvPicPr>
-          <p:nvPr/>
-        </p:nvPicPr>
-        <p:blipFill>
-          <a:blip r:embed="rId7"/>
-          <a:stretch>
-            <a:fillRect/>
-          </a:stretch>
-        </p:blipFill>
-        <p:spPr>
-          <a:xfrm>
-            <a:off x="6572444" y="3861290"/>
-            <a:ext cx="1054610" cy="887293"/>
-          </a:xfrm>
-          <a:prstGeom prst="rect">
-            <a:avLst/>
-          </a:prstGeom>
-        </p:spPr>
-      </p:pic>
-      <p:pic>
-        <p:nvPicPr>
-          <p:cNvPr id="11" name="Imagem 10"/>
-          <p:cNvPicPr>
-            <a:picLocks noChangeAspect="1"/>
-          </p:cNvPicPr>
-          <p:nvPr/>
-        </p:nvPicPr>
-        <p:blipFill>
-          <a:blip r:embed="rId8"/>
-          <a:stretch>
-            <a:fillRect/>
-          </a:stretch>
-        </p:blipFill>
-        <p:spPr>
-          <a:xfrm>
-            <a:off x="4483248" y="3830951"/>
-            <a:ext cx="865430" cy="824049"/>
-          </a:xfrm>
-          <a:prstGeom prst="rect">
-            <a:avLst/>
-          </a:prstGeom>
-        </p:spPr>
-      </p:pic>
-      <p:pic>
-        <p:nvPicPr>
-          <p:cNvPr id="48" name="Imagem 47" descr="Uma imagem contendo Logotipo&#10;&#10;Descrição gerada automaticamente">
-            <a:extLst>
-              <a:ext uri="{FF2B5EF4-FFF2-40B4-BE49-F238E27FC236}">
-                <a16:creationId xmlns:a16="http://schemas.microsoft.com/office/drawing/2014/main" id="{37A3A6F7-6D70-34C9-5234-30C3FD828D45}"/>
-              </a:ext>
-            </a:extLst>
-          </p:cNvPr>
-          <p:cNvPicPr>
-            <a:picLocks noChangeAspect="1"/>
-          </p:cNvPicPr>
-          <p:nvPr/>
-        </p:nvPicPr>
-        <p:blipFill>
-          <a:blip r:embed="rId9" cstate="print">
-            <a:extLst>
-              <a:ext uri="{28A0092B-C50C-407E-A947-70E740481C1C}">
-                <a14:useLocalDpi xmlns:a14="http://schemas.microsoft.com/office/drawing/2010/main" val="0"/>
-              </a:ext>
-            </a:extLst>
-          </a:blip>
-          <a:stretch>
-            <a:fillRect/>
-          </a:stretch>
-        </p:blipFill>
-        <p:spPr>
-          <a:xfrm>
-            <a:off x="5885819" y="675133"/>
-            <a:ext cx="737226" cy="737226"/>
-          </a:xfrm>
-          <a:prstGeom prst="rect">
-            <a:avLst/>
-          </a:prstGeom>
-        </p:spPr>
-      </p:pic>
-      <p:pic>
-        <p:nvPicPr>
-          <p:cNvPr id="7" name="Imagem 6" descr="Interface gráfica do usuário, Aplicativo&#10;&#10;Descrição gerada automaticamente">
-            <a:extLst>
-              <a:ext uri="{FF2B5EF4-FFF2-40B4-BE49-F238E27FC236}">
-                <a16:creationId xmlns:a16="http://schemas.microsoft.com/office/drawing/2014/main" id="{77CF2888-E228-32DB-C527-16E3385CA6D4}"/>
-              </a:ext>
-            </a:extLst>
-          </p:cNvPr>
-          <p:cNvPicPr>
-            <a:picLocks noChangeAspect="1"/>
-          </p:cNvPicPr>
-          <p:nvPr/>
-        </p:nvPicPr>
-        <p:blipFill rotWithShape="1">
-          <a:blip r:embed="rId10">
-            <a:extLst>
-              <a:ext uri="{28A0092B-C50C-407E-A947-70E740481C1C}">
-                <a14:useLocalDpi xmlns:a14="http://schemas.microsoft.com/office/drawing/2010/main" val="0"/>
-              </a:ext>
-            </a:extLst>
-          </a:blip>
-          <a:srcRect l="32643" t="33857" r="43559" b="47260"/>
-          <a:stretch/>
-        </p:blipFill>
-        <p:spPr>
-          <a:xfrm>
-            <a:off x="5232903" y="2669337"/>
-            <a:ext cx="1183396" cy="888676"/>
-          </a:xfrm>
-          <a:prstGeom prst="rect">
-            <a:avLst/>
-          </a:prstGeom>
-        </p:spPr>
-      </p:pic>
-    </p:spTree>
-    <p:extLst>
-      <p:ext uri="{BB962C8B-B14F-4D97-AF65-F5344CB8AC3E}">
-        <p14:creationId xmlns:p14="http://schemas.microsoft.com/office/powerpoint/2010/main" val="2047561101"/>
-      </p:ext>
-    </p:extLst>
-  </p:cSld>
-  <p:clrMapOvr>
-    <a:masterClrMapping/>
-  </p:clrMapOvr>
-</p:sld>
-</file>
-
-<file path=ppt/slides/slide5.xml><?xml version="1.0" encoding="utf-8"?>
-<p:sld xmlns:a="http://schemas.openxmlformats.org/drawingml/2006/main" xmlns:r="http://schemas.openxmlformats.org/officeDocument/2006/relationships" xmlns:p="http://schemas.openxmlformats.org/presentationml/2006/main">
-  <p:cSld>
-    <p:bg>
-      <p:bgPr>
-        <a:solidFill>
-          <a:srgbClr val="F2F2F2"/>
-        </a:solidFill>
-        <a:effectLst/>
-      </p:bgPr>
-    </p:bg>
-    <p:spTree>
-      <p:nvGrpSpPr>
-        <p:cNvPr id="1" name=""/>
-        <p:cNvGrpSpPr/>
-        <p:nvPr/>
-      </p:nvGrpSpPr>
-      <p:grpSpPr>
-        <a:xfrm>
-          <a:off x="0" y="0"/>
-          <a:ext cx="0" cy="0"/>
-          <a:chOff x="0" y="0"/>
-          <a:chExt cx="0" cy="0"/>
-        </a:xfrm>
-      </p:grpSpPr>
-      <p:sp>
-        <p:nvSpPr>
-          <p:cNvPr id="2" name="Retângulo 1"/>
-          <p:cNvSpPr/>
-          <p:nvPr/>
-        </p:nvSpPr>
-        <p:spPr>
-          <a:xfrm>
-            <a:off x="0" y="0"/>
-            <a:ext cx="12192000" cy="6858000"/>
-          </a:xfrm>
-          <a:prstGeom prst="rect">
-            <a:avLst/>
-          </a:prstGeom>
-          <a:solidFill>
-            <a:srgbClr val="F2F2F2"/>
-          </a:solidFill>
-          <a:ln>
-            <a:noFill/>
-          </a:ln>
-        </p:spPr>
-        <p:style>
-          <a:lnRef idx="2">
-            <a:schemeClr val="accent1">
-              <a:shade val="50000"/>
-            </a:schemeClr>
-          </a:lnRef>
-          <a:fillRef idx="1">
-            <a:schemeClr val="accent1"/>
-          </a:fillRef>
-          <a:effectRef idx="0">
-            <a:schemeClr val="accent1"/>
-          </a:effectRef>
-          <a:fontRef idx="minor">
-            <a:schemeClr val="lt1"/>
-          </a:fontRef>
-        </p:style>
-        <p:txBody>
-          <a:bodyPr rtlCol="0" anchor="ctr"/>
-          <a:lstStyle/>
-          <a:p>
-            <a:pPr algn="ctr"/>
-            <a:endParaRPr lang="pt-BR"/>
-          </a:p>
-        </p:txBody>
-      </p:sp>
-      <p:sp>
-        <p:nvSpPr>
-          <p:cNvPr id="20" name="Retângulo de cantos arredondados 19"/>
-          <p:cNvSpPr/>
-          <p:nvPr/>
-        </p:nvSpPr>
-        <p:spPr>
-          <a:xfrm>
-            <a:off x="1619465" y="2810159"/>
-            <a:ext cx="1694079" cy="1517901"/>
-          </a:xfrm>
-          <a:prstGeom prst="roundRect">
-            <a:avLst/>
-          </a:prstGeom>
-          <a:solidFill>
-            <a:srgbClr val="F2F2F2"/>
-          </a:solidFill>
-          <a:effectLst>
-            <a:outerShdw blurRad="50800" dist="50800" dir="5400000" algn="ctr" rotWithShape="0">
-              <a:srgbClr val="F2F2F2"/>
-            </a:outerShdw>
-          </a:effectLst>
-        </p:spPr>
-        <p:style>
-          <a:lnRef idx="2">
-            <a:schemeClr val="accent1">
-              <a:shade val="50000"/>
-            </a:schemeClr>
-          </a:lnRef>
-          <a:fillRef idx="1">
-            <a:schemeClr val="accent1"/>
-          </a:fillRef>
-          <a:effectRef idx="0">
-            <a:schemeClr val="accent1"/>
-          </a:effectRef>
-          <a:fontRef idx="minor">
-            <a:schemeClr val="lt1"/>
-          </a:fontRef>
-        </p:style>
-        <p:txBody>
-          <a:bodyPr rtlCol="0" anchor="ctr"/>
-          <a:lstStyle/>
-          <a:p>
-            <a:pPr algn="ctr"/>
-            <a:endParaRPr lang="pt-BR"/>
-          </a:p>
-        </p:txBody>
-      </p:sp>
-      <p:sp>
-        <p:nvSpPr>
-          <p:cNvPr id="13" name="Retângulo de cantos arredondados 12"/>
-          <p:cNvSpPr/>
-          <p:nvPr/>
-        </p:nvSpPr>
-        <p:spPr>
-          <a:xfrm>
-            <a:off x="3686613" y="2800567"/>
-            <a:ext cx="1694079" cy="1527493"/>
-          </a:xfrm>
-          <a:prstGeom prst="roundRect">
-            <a:avLst/>
-          </a:prstGeom>
-          <a:solidFill>
-            <a:srgbClr val="F2F2F2"/>
-          </a:solidFill>
-        </p:spPr>
-        <p:style>
-          <a:lnRef idx="2">
-            <a:schemeClr val="accent1">
-              <a:shade val="50000"/>
-            </a:schemeClr>
-          </a:lnRef>
-          <a:fillRef idx="1">
-            <a:schemeClr val="accent1"/>
-          </a:fillRef>
-          <a:effectRef idx="0">
-            <a:schemeClr val="accent1"/>
-          </a:effectRef>
-          <a:fontRef idx="minor">
-            <a:schemeClr val="lt1"/>
-          </a:fontRef>
-        </p:style>
-        <p:txBody>
-          <a:bodyPr rtlCol="0" anchor="ctr"/>
-          <a:lstStyle/>
-          <a:p>
-            <a:pPr algn="ctr"/>
-            <a:endParaRPr lang="pt-BR"/>
-          </a:p>
-        </p:txBody>
-      </p:sp>
-      <p:sp>
-        <p:nvSpPr>
-          <p:cNvPr id="4" name="Título 1"/>
-          <p:cNvSpPr txBox="1">
-            <a:spLocks/>
-          </p:cNvSpPr>
-          <p:nvPr/>
-        </p:nvSpPr>
-        <p:spPr>
-          <a:xfrm>
-            <a:off x="127000" y="433838"/>
-            <a:ext cx="4579414" cy="840779"/>
-          </a:xfrm>
-          <a:prstGeom prst="rect">
-            <a:avLst/>
-          </a:prstGeom>
-        </p:spPr>
-        <p:txBody>
-          <a:bodyPr vert="horz" lIns="91440" tIns="45720" rIns="91440" bIns="45720" rtlCol="0" anchor="ctr">
-            <a:normAutofit/>
-          </a:bodyPr>
-          <a:lstStyle>
-            <a:lvl1pPr algn="l" defTabSz="914400" rtl="0" eaLnBrk="1" latinLnBrk="0" hangingPunct="1">
-              <a:lnSpc>
-                <a:spcPct val="90000"/>
-              </a:lnSpc>
-              <a:spcBef>
-                <a:spcPct val="0"/>
-              </a:spcBef>
-              <a:buNone/>
-              <a:defRPr sz="4400" kern="1200">
-                <a:solidFill>
-                  <a:schemeClr val="tx1"/>
-                </a:solidFill>
-                <a:latin typeface="+mj-lt"/>
-                <a:ea typeface="+mj-ea"/>
-                <a:cs typeface="+mj-cs"/>
-              </a:defRPr>
-            </a:lvl1pPr>
-          </a:lstStyle>
-          <a:p>
-            <a:r>
-              <a:rPr lang="pt-BR" sz="3600" b="1" dirty="0">
-                <a:ln w="9525">
-                  <a:solidFill>
-                    <a:schemeClr val="bg1"/>
-                  </a:solidFill>
-                  <a:prstDash val="solid"/>
-                </a:ln>
-                <a:solidFill>
-                  <a:schemeClr val="accent5"/>
-                </a:solidFill>
-                <a:effectLst>
-                  <a:outerShdw blurRad="12700" dist="38100" dir="2700000" algn="tl" rotWithShape="0">
-                    <a:schemeClr val="accent5">
-                      <a:lumMod val="60000"/>
-                      <a:lumOff val="40000"/>
-                    </a:schemeClr>
-                  </a:outerShdw>
-                </a:effectLst>
-                <a:latin typeface="Arial" panose="020B0604020202020204" pitchFamily="34" charset="0"/>
-                <a:cs typeface="Arial" panose="020B0604020202020204" pitchFamily="34" charset="0"/>
-              </a:rPr>
-              <a:t>Hidrometria</a:t>
-            </a:r>
-          </a:p>
-        </p:txBody>
-      </p:sp>
-      <p:pic>
-        <p:nvPicPr>
-          <p:cNvPr id="6" name="Imagem 5"/>
-          <p:cNvPicPr>
-            <a:picLocks noChangeAspect="1"/>
-          </p:cNvPicPr>
-          <p:nvPr/>
-        </p:nvPicPr>
-        <p:blipFill>
-          <a:blip r:embed="rId2"/>
-          <a:stretch>
-            <a:fillRect/>
-          </a:stretch>
-        </p:blipFill>
-        <p:spPr>
-          <a:xfrm>
-            <a:off x="9637095" y="42990"/>
-            <a:ext cx="2554905" cy="1379409"/>
-          </a:xfrm>
-          <a:prstGeom prst="rect">
-            <a:avLst/>
-          </a:prstGeom>
-        </p:spPr>
-      </p:pic>
-      <p:pic>
-        <p:nvPicPr>
-          <p:cNvPr id="16" name="Imagem 15"/>
-          <p:cNvPicPr>
-            <a:picLocks noChangeAspect="1"/>
-          </p:cNvPicPr>
-          <p:nvPr/>
-        </p:nvPicPr>
-        <p:blipFill>
-          <a:blip r:embed="rId3"/>
-          <a:stretch>
-            <a:fillRect/>
-          </a:stretch>
-        </p:blipFill>
-        <p:spPr>
-          <a:xfrm>
-            <a:off x="2078723" y="2858976"/>
-            <a:ext cx="888676" cy="888676"/>
-          </a:xfrm>
-          <a:prstGeom prst="rect">
-            <a:avLst/>
-          </a:prstGeom>
-        </p:spPr>
-      </p:pic>
-      <p:sp>
-        <p:nvSpPr>
-          <p:cNvPr id="17" name="CaixaDeTexto 16"/>
-          <p:cNvSpPr txBox="1"/>
-          <p:nvPr/>
-        </p:nvSpPr>
-        <p:spPr>
-          <a:xfrm>
-            <a:off x="1625636" y="3662679"/>
-            <a:ext cx="1685987" cy="646331"/>
-          </a:xfrm>
-          <a:prstGeom prst="rect">
-            <a:avLst/>
-          </a:prstGeom>
-          <a:noFill/>
-        </p:spPr>
-        <p:txBody>
-          <a:bodyPr wrap="square" rtlCol="0">
-            <a:spAutoFit/>
-          </a:bodyPr>
-          <a:lstStyle/>
-          <a:p>
-            <a:pPr algn="ctr"/>
-            <a:r>
-              <a:rPr lang="pt-BR" dirty="0">
-                <a:ln w="0"/>
-                <a:effectLst>
-                  <a:outerShdw blurRad="38100" dist="19050" dir="2700000" algn="tl" rotWithShape="0">
-                    <a:schemeClr val="dk1">
-                      <a:alpha val="40000"/>
-                    </a:schemeClr>
-                  </a:outerShdw>
-                </a:effectLst>
-              </a:rPr>
-              <a:t>Estudo de leitura</a:t>
-            </a:r>
-            <a:endParaRPr lang="pt-BR" dirty="0"/>
-          </a:p>
-        </p:txBody>
-      </p:sp>
-      <p:pic>
-        <p:nvPicPr>
-          <p:cNvPr id="8" name="Imagem 7"/>
-          <p:cNvPicPr>
-            <a:picLocks noChangeAspect="1"/>
-          </p:cNvPicPr>
-          <p:nvPr/>
-        </p:nvPicPr>
-        <p:blipFill>
-          <a:blip r:embed="rId4"/>
-          <a:stretch>
-            <a:fillRect/>
-          </a:stretch>
-        </p:blipFill>
-        <p:spPr>
-          <a:xfrm>
-            <a:off x="4032076" y="2858976"/>
-            <a:ext cx="1054610" cy="887293"/>
-          </a:xfrm>
-          <a:prstGeom prst="rect">
-            <a:avLst/>
-          </a:prstGeom>
-        </p:spPr>
-      </p:pic>
-      <p:sp>
-        <p:nvSpPr>
-          <p:cNvPr id="28" name="CaixaDeTexto 27"/>
-          <p:cNvSpPr txBox="1"/>
-          <p:nvPr/>
-        </p:nvSpPr>
-        <p:spPr>
-          <a:xfrm>
-            <a:off x="3716353" y="3687939"/>
-            <a:ext cx="1685987" cy="646331"/>
-          </a:xfrm>
-          <a:prstGeom prst="rect">
-            <a:avLst/>
-          </a:prstGeom>
-          <a:noFill/>
-        </p:spPr>
-        <p:txBody>
-          <a:bodyPr wrap="square" rtlCol="0">
-            <a:spAutoFit/>
-          </a:bodyPr>
-          <a:lstStyle/>
-          <a:p>
-            <a:pPr algn="ctr"/>
-            <a:r>
-              <a:rPr lang="pt-BR" dirty="0">
-                <a:ln w="0"/>
-                <a:effectLst>
-                  <a:outerShdw blurRad="38100" dist="19050" dir="2700000" algn="tl" rotWithShape="0">
-                    <a:schemeClr val="dk1">
-                      <a:alpha val="40000"/>
-                    </a:schemeClr>
-                  </a:outerShdw>
-                </a:effectLst>
-              </a:rPr>
-              <a:t>Troca de hidrômetros</a:t>
-            </a:r>
-            <a:endParaRPr lang="pt-BR" dirty="0"/>
-          </a:p>
-        </p:txBody>
-      </p:sp>
-      <p:sp>
-        <p:nvSpPr>
-          <p:cNvPr id="3" name="Retângulo de cantos arredondados 12">
-            <a:extLst>
-              <a:ext uri="{FF2B5EF4-FFF2-40B4-BE49-F238E27FC236}">
-                <a16:creationId xmlns:a16="http://schemas.microsoft.com/office/drawing/2014/main" id="{8C811CEC-B1D3-8FBB-0725-75DA13C24767}"/>
-              </a:ext>
-            </a:extLst>
-          </p:cNvPr>
-          <p:cNvSpPr/>
-          <p:nvPr/>
-        </p:nvSpPr>
-        <p:spPr>
-          <a:xfrm>
-            <a:off x="5742514" y="2800566"/>
-            <a:ext cx="1694079" cy="1527493"/>
-          </a:xfrm>
-          <a:prstGeom prst="roundRect">
-            <a:avLst/>
-          </a:prstGeom>
-          <a:solidFill>
-            <a:srgbClr val="F2F2F2"/>
-          </a:solidFill>
-        </p:spPr>
-        <p:style>
-          <a:lnRef idx="2">
-            <a:schemeClr val="accent1">
-              <a:shade val="50000"/>
-            </a:schemeClr>
-          </a:lnRef>
-          <a:fillRef idx="1">
-            <a:schemeClr val="accent1"/>
-          </a:fillRef>
-          <a:effectRef idx="0">
-            <a:schemeClr val="accent1"/>
-          </a:effectRef>
-          <a:fontRef idx="minor">
-            <a:schemeClr val="lt1"/>
-          </a:fontRef>
-        </p:style>
-        <p:txBody>
-          <a:bodyPr rtlCol="0" anchor="ctr"/>
-          <a:lstStyle/>
-          <a:p>
-            <a:pPr algn="ctr"/>
-            <a:endParaRPr lang="pt-BR"/>
-          </a:p>
-        </p:txBody>
-      </p:sp>
-      <p:sp>
-        <p:nvSpPr>
-          <p:cNvPr id="5" name="CaixaDeTexto 4">
-            <a:extLst>
-              <a:ext uri="{FF2B5EF4-FFF2-40B4-BE49-F238E27FC236}">
-                <a16:creationId xmlns:a16="http://schemas.microsoft.com/office/drawing/2014/main" id="{0E3DB1AE-EF27-55C9-C54D-90C499A4BEAA}"/>
-              </a:ext>
-            </a:extLst>
-          </p:cNvPr>
-          <p:cNvSpPr txBox="1"/>
-          <p:nvPr/>
-        </p:nvSpPr>
-        <p:spPr>
-          <a:xfrm>
-            <a:off x="5744119" y="3668009"/>
-            <a:ext cx="1685987" cy="646331"/>
-          </a:xfrm>
-          <a:prstGeom prst="rect">
-            <a:avLst/>
-          </a:prstGeom>
-          <a:noFill/>
-        </p:spPr>
-        <p:txBody>
-          <a:bodyPr wrap="square" rtlCol="0">
-            <a:spAutoFit/>
-          </a:bodyPr>
-          <a:lstStyle/>
-          <a:p>
-            <a:pPr algn="ctr"/>
-            <a:r>
-              <a:rPr lang="pt-BR" dirty="0">
-                <a:ln w="0"/>
-                <a:effectLst>
-                  <a:outerShdw blurRad="38100" dist="19050" dir="2700000" algn="tl" rotWithShape="0">
-                    <a:schemeClr val="dk1">
-                      <a:alpha val="40000"/>
-                    </a:schemeClr>
-                  </a:outerShdw>
-                </a:effectLst>
-              </a:rPr>
-              <a:t>Painel de Análise de HDs</a:t>
-            </a:r>
-            <a:endParaRPr lang="pt-BR" dirty="0"/>
-          </a:p>
-        </p:txBody>
-      </p:sp>
-      <p:pic>
-        <p:nvPicPr>
-          <p:cNvPr id="9" name="Imagem 8">
-            <a:extLst>
-              <a:ext uri="{FF2B5EF4-FFF2-40B4-BE49-F238E27FC236}">
-                <a16:creationId xmlns:a16="http://schemas.microsoft.com/office/drawing/2014/main" id="{061BD823-B64F-D639-4332-430AFC903606}"/>
-              </a:ext>
-            </a:extLst>
-          </p:cNvPr>
-          <p:cNvPicPr>
-            <a:picLocks noChangeAspect="1"/>
-          </p:cNvPicPr>
-          <p:nvPr/>
-        </p:nvPicPr>
-        <p:blipFill rotWithShape="1">
-          <a:blip r:embed="rId5"/>
-          <a:srcRect t="1540"/>
-          <a:stretch/>
-        </p:blipFill>
-        <p:spPr>
-          <a:xfrm>
-            <a:off x="6150695" y="2858630"/>
-            <a:ext cx="910713" cy="896692"/>
-          </a:xfrm>
-          <a:prstGeom prst="rect">
-            <a:avLst/>
-          </a:prstGeom>
-        </p:spPr>
-      </p:pic>
-      <p:sp>
-        <p:nvSpPr>
-          <p:cNvPr id="7" name="Retângulo de cantos arredondados 12">
-            <a:extLst>
-              <a:ext uri="{FF2B5EF4-FFF2-40B4-BE49-F238E27FC236}">
-                <a16:creationId xmlns:a16="http://schemas.microsoft.com/office/drawing/2014/main" id="{E6F850DC-55FF-481F-CA1C-8EA4B3652E4A}"/>
-              </a:ext>
-            </a:extLst>
-          </p:cNvPr>
-          <p:cNvSpPr/>
-          <p:nvPr/>
-        </p:nvSpPr>
-        <p:spPr>
-          <a:xfrm>
-            <a:off x="7771256" y="2810159"/>
-            <a:ext cx="1694079" cy="1527493"/>
-          </a:xfrm>
-          <a:prstGeom prst="roundRect">
-            <a:avLst/>
-          </a:prstGeom>
-          <a:solidFill>
-            <a:srgbClr val="F2F2F2"/>
-          </a:solidFill>
-        </p:spPr>
-        <p:style>
-          <a:lnRef idx="2">
-            <a:schemeClr val="accent1">
-              <a:shade val="50000"/>
-            </a:schemeClr>
-          </a:lnRef>
-          <a:fillRef idx="1">
-            <a:schemeClr val="accent1"/>
-          </a:fillRef>
-          <a:effectRef idx="0">
-            <a:schemeClr val="accent1"/>
-          </a:effectRef>
-          <a:fontRef idx="minor">
-            <a:schemeClr val="lt1"/>
-          </a:fontRef>
-        </p:style>
-        <p:txBody>
-          <a:bodyPr rtlCol="0" anchor="ctr"/>
-          <a:lstStyle/>
-          <a:p>
-            <a:pPr algn="ctr"/>
-            <a:endParaRPr lang="pt-BR"/>
-          </a:p>
-        </p:txBody>
-      </p:sp>
-      <p:sp>
-        <p:nvSpPr>
-          <p:cNvPr id="11" name="CaixaDeTexto 10">
-            <a:extLst>
-              <a:ext uri="{FF2B5EF4-FFF2-40B4-BE49-F238E27FC236}">
-                <a16:creationId xmlns:a16="http://schemas.microsoft.com/office/drawing/2014/main" id="{A39D0737-141E-9038-F8AA-13A2F79013DF}"/>
-              </a:ext>
-            </a:extLst>
-          </p:cNvPr>
-          <p:cNvSpPr txBox="1"/>
-          <p:nvPr/>
-        </p:nvSpPr>
-        <p:spPr>
-          <a:xfrm>
-            <a:off x="7774798" y="3677062"/>
-            <a:ext cx="1685987" cy="646331"/>
-          </a:xfrm>
-          <a:prstGeom prst="rect">
-            <a:avLst/>
-          </a:prstGeom>
-          <a:noFill/>
-        </p:spPr>
-        <p:txBody>
-          <a:bodyPr wrap="square" rtlCol="0">
-            <a:spAutoFit/>
-          </a:bodyPr>
-          <a:lstStyle/>
-          <a:p>
-            <a:pPr algn="ctr"/>
-            <a:r>
-              <a:rPr lang="pt-BR" dirty="0">
-                <a:ln w="0"/>
-                <a:effectLst>
-                  <a:outerShdw blurRad="38100" dist="19050" dir="2700000" algn="tl" rotWithShape="0">
-                    <a:schemeClr val="dk1">
-                      <a:alpha val="40000"/>
-                    </a:schemeClr>
-                  </a:outerShdw>
-                </a:effectLst>
-              </a:rPr>
-              <a:t>Análise por logradouro</a:t>
-            </a:r>
-            <a:endParaRPr lang="pt-BR" dirty="0"/>
-          </a:p>
-        </p:txBody>
-      </p:sp>
-      <p:pic>
-        <p:nvPicPr>
-          <p:cNvPr id="14" name="Imagem 13" descr="Ícone&#10;&#10;Descrição gerada automaticamente com confiança baixa">
-            <a:extLst>
-              <a:ext uri="{FF2B5EF4-FFF2-40B4-BE49-F238E27FC236}">
-                <a16:creationId xmlns:a16="http://schemas.microsoft.com/office/drawing/2014/main" id="{1AF85D14-E83F-7467-3270-863AFB2383B5}"/>
-              </a:ext>
-            </a:extLst>
-          </p:cNvPr>
-          <p:cNvPicPr>
-            <a:picLocks noChangeAspect="1"/>
-          </p:cNvPicPr>
-          <p:nvPr/>
-        </p:nvPicPr>
-        <p:blipFill>
-          <a:blip r:embed="rId6">
-            <a:extLst>
-              <a:ext uri="{28A0092B-C50C-407E-A947-70E740481C1C}">
-                <a14:useLocalDpi xmlns:a14="http://schemas.microsoft.com/office/drawing/2010/main" val="0"/>
-              </a:ext>
-            </a:extLst>
-          </a:blip>
-          <a:stretch>
-            <a:fillRect/>
-          </a:stretch>
-        </p:blipFill>
-        <p:spPr>
-          <a:xfrm>
-            <a:off x="8146748" y="2854559"/>
-            <a:ext cx="971952" cy="852218"/>
-          </a:xfrm>
-          <a:prstGeom prst="rect">
-            <a:avLst/>
-          </a:prstGeom>
-        </p:spPr>
-      </p:pic>
-    </p:spTree>
-    <p:extLst>
-      <p:ext uri="{BB962C8B-B14F-4D97-AF65-F5344CB8AC3E}">
-        <p14:creationId xmlns:p14="http://schemas.microsoft.com/office/powerpoint/2010/main" val="2860503161"/>
       </p:ext>
     </p:extLst>
   </p:cSld>

</xml_diff>